<commit_message>
More minor tweaks, cleaning up rogue path in NAT gateway SVG
</commit_message>
<xml_diff>
--- a/pattern/large-vpc-for-amazon-ecs-cluster/diagram.pptx
+++ b/pattern/large-vpc-for-amazon-ecs-cluster/diagram.pptx
@@ -104,6 +104,11 @@
       </a:defRPr>
     </a:lvl9pPr>
   </p:defaultTextStyle>
+  <p:extLst>
+    <p:ext uri="{EFAFB233-063F-42B5-8137-9DF3F51BA10A}">
+      <p15:sldGuideLst xmlns:p15="http://schemas.microsoft.com/office/powerpoint/2012/main"/>
+    </p:ext>
+  </p:extLst>
 </p:presentation>
 </file>
 
@@ -254,7 +259,7 @@
           <a:p>
             <a:fld id="{55F0E5CF-1040-4245-9F91-D18CDDA0757F}" type="datetimeFigureOut">
               <a:rPr lang="en-US" smtClean="0"/>
-              <a:t>5/3/23</a:t>
+              <a:t>5/15/23</a:t>
             </a:fld>
             <a:endParaRPr lang="en-US"/>
           </a:p>
@@ -452,7 +457,7 @@
           <a:p>
             <a:fld id="{55F0E5CF-1040-4245-9F91-D18CDDA0757F}" type="datetimeFigureOut">
               <a:rPr lang="en-US" smtClean="0"/>
-              <a:t>5/3/23</a:t>
+              <a:t>5/15/23</a:t>
             </a:fld>
             <a:endParaRPr lang="en-US"/>
           </a:p>
@@ -660,7 +665,7 @@
           <a:p>
             <a:fld id="{55F0E5CF-1040-4245-9F91-D18CDDA0757F}" type="datetimeFigureOut">
               <a:rPr lang="en-US" smtClean="0"/>
-              <a:t>5/3/23</a:t>
+              <a:t>5/15/23</a:t>
             </a:fld>
             <a:endParaRPr lang="en-US"/>
           </a:p>
@@ -858,7 +863,7 @@
           <a:p>
             <a:fld id="{55F0E5CF-1040-4245-9F91-D18CDDA0757F}" type="datetimeFigureOut">
               <a:rPr lang="en-US" smtClean="0"/>
-              <a:t>5/3/23</a:t>
+              <a:t>5/15/23</a:t>
             </a:fld>
             <a:endParaRPr lang="en-US"/>
           </a:p>
@@ -1133,7 +1138,7 @@
           <a:p>
             <a:fld id="{55F0E5CF-1040-4245-9F91-D18CDDA0757F}" type="datetimeFigureOut">
               <a:rPr lang="en-US" smtClean="0"/>
-              <a:t>5/3/23</a:t>
+              <a:t>5/15/23</a:t>
             </a:fld>
             <a:endParaRPr lang="en-US"/>
           </a:p>
@@ -1398,7 +1403,7 @@
           <a:p>
             <a:fld id="{55F0E5CF-1040-4245-9F91-D18CDDA0757F}" type="datetimeFigureOut">
               <a:rPr lang="en-US" smtClean="0"/>
-              <a:t>5/3/23</a:t>
+              <a:t>5/15/23</a:t>
             </a:fld>
             <a:endParaRPr lang="en-US"/>
           </a:p>
@@ -1810,7 +1815,7 @@
           <a:p>
             <a:fld id="{55F0E5CF-1040-4245-9F91-D18CDDA0757F}" type="datetimeFigureOut">
               <a:rPr lang="en-US" smtClean="0"/>
-              <a:t>5/3/23</a:t>
+              <a:t>5/15/23</a:t>
             </a:fld>
             <a:endParaRPr lang="en-US"/>
           </a:p>
@@ -1951,7 +1956,7 @@
           <a:p>
             <a:fld id="{55F0E5CF-1040-4245-9F91-D18CDDA0757F}" type="datetimeFigureOut">
               <a:rPr lang="en-US" smtClean="0"/>
-              <a:t>5/3/23</a:t>
+              <a:t>5/15/23</a:t>
             </a:fld>
             <a:endParaRPr lang="en-US"/>
           </a:p>
@@ -2064,7 +2069,7 @@
           <a:p>
             <a:fld id="{55F0E5CF-1040-4245-9F91-D18CDDA0757F}" type="datetimeFigureOut">
               <a:rPr lang="en-US" smtClean="0"/>
-              <a:t>5/3/23</a:t>
+              <a:t>5/15/23</a:t>
             </a:fld>
             <a:endParaRPr lang="en-US"/>
           </a:p>
@@ -2375,7 +2380,7 @@
           <a:p>
             <a:fld id="{55F0E5CF-1040-4245-9F91-D18CDDA0757F}" type="datetimeFigureOut">
               <a:rPr lang="en-US" smtClean="0"/>
-              <a:t>5/3/23</a:t>
+              <a:t>5/15/23</a:t>
             </a:fld>
             <a:endParaRPr lang="en-US"/>
           </a:p>
@@ -2663,7 +2668,7 @@
           <a:p>
             <a:fld id="{55F0E5CF-1040-4245-9F91-D18CDDA0757F}" type="datetimeFigureOut">
               <a:rPr lang="en-US" smtClean="0"/>
-              <a:t>5/3/23</a:t>
+              <a:t>5/15/23</a:t>
             </a:fld>
             <a:endParaRPr lang="en-US"/>
           </a:p>
@@ -2904,7 +2909,7 @@
           <a:p>
             <a:fld id="{55F0E5CF-1040-4245-9F91-D18CDDA0757F}" type="datetimeFigureOut">
               <a:rPr lang="en-US" smtClean="0"/>
-              <a:t>5/3/23</a:t>
+              <a:t>5/15/23</a:t>
             </a:fld>
             <a:endParaRPr lang="en-US"/>
           </a:p>
@@ -4096,10 +4101,10 @@
       </p:sp>
       <p:pic>
         <p:nvPicPr>
-          <p:cNvPr id="125" name="Graphic 124">
-            <a:extLst>
-              <a:ext uri="{FF2B5EF4-FFF2-40B4-BE49-F238E27FC236}">
-                <a16:creationId xmlns:a16="http://schemas.microsoft.com/office/drawing/2014/main" id="{6E2EB34B-197A-7363-AA49-3BA1790F7024}"/>
+          <p:cNvPr id="128" name="Graphic 127">
+            <a:extLst>
+              <a:ext uri="{FF2B5EF4-FFF2-40B4-BE49-F238E27FC236}">
+                <a16:creationId xmlns:a16="http://schemas.microsoft.com/office/drawing/2014/main" id="{727CFEAF-F392-E671-D5E0-159672329E9E}"/>
               </a:ext>
             </a:extLst>
           </p:cNvPr>
@@ -4113,78 +4118,6 @@
             <a:extLst>
               <a:ext uri="{96DAC541-7B7A-43D3-8B79-37D633B846F1}">
                 <asvg:svgBlip xmlns:asvg="http://schemas.microsoft.com/office/drawing/2016/SVG/main" r:embed="rId5"/>
-              </a:ext>
-            </a:extLst>
-          </a:blip>
-          <a:stretch>
-            <a:fillRect/>
-          </a:stretch>
-        </p:blipFill>
-        <p:spPr>
-          <a:xfrm>
-            <a:off x="3340854" y="2671846"/>
-            <a:ext cx="453159" cy="453159"/>
-          </a:xfrm>
-          <a:prstGeom prst="rect">
-            <a:avLst/>
-          </a:prstGeom>
-        </p:spPr>
-      </p:pic>
-      <p:pic>
-        <p:nvPicPr>
-          <p:cNvPr id="126" name="Graphic 125">
-            <a:extLst>
-              <a:ext uri="{FF2B5EF4-FFF2-40B4-BE49-F238E27FC236}">
-                <a16:creationId xmlns:a16="http://schemas.microsoft.com/office/drawing/2014/main" id="{B42A4B7C-2C6C-CBDE-DA62-5B4AB6BF0EE8}"/>
-              </a:ext>
-            </a:extLst>
-          </p:cNvPr>
-          <p:cNvPicPr>
-            <a:picLocks noChangeAspect="1"/>
-          </p:cNvPicPr>
-          <p:nvPr/>
-        </p:nvPicPr>
-        <p:blipFill>
-          <a:blip r:embed="rId4">
-            <a:extLst>
-              <a:ext uri="{96DAC541-7B7A-43D3-8B79-37D633B846F1}">
-                <asvg:svgBlip xmlns:asvg="http://schemas.microsoft.com/office/drawing/2016/SVG/main" r:embed="rId5"/>
-              </a:ext>
-            </a:extLst>
-          </a:blip>
-          <a:stretch>
-            <a:fillRect/>
-          </a:stretch>
-        </p:blipFill>
-        <p:spPr>
-          <a:xfrm>
-            <a:off x="5642841" y="2671846"/>
-            <a:ext cx="453159" cy="453159"/>
-          </a:xfrm>
-          <a:prstGeom prst="rect">
-            <a:avLst/>
-          </a:prstGeom>
-        </p:spPr>
-      </p:pic>
-      <p:pic>
-        <p:nvPicPr>
-          <p:cNvPr id="128" name="Graphic 127">
-            <a:extLst>
-              <a:ext uri="{FF2B5EF4-FFF2-40B4-BE49-F238E27FC236}">
-                <a16:creationId xmlns:a16="http://schemas.microsoft.com/office/drawing/2014/main" id="{727CFEAF-F392-E671-D5E0-159672329E9E}"/>
-              </a:ext>
-            </a:extLst>
-          </p:cNvPr>
-          <p:cNvPicPr>
-            <a:picLocks noChangeAspect="1"/>
-          </p:cNvPicPr>
-          <p:nvPr/>
-        </p:nvPicPr>
-        <p:blipFill>
-          <a:blip r:embed="rId6">
-            <a:extLst>
-              <a:ext uri="{96DAC541-7B7A-43D3-8B79-37D633B846F1}">
-                <asvg:svgBlip xmlns:asvg="http://schemas.microsoft.com/office/drawing/2016/SVG/main" r:embed="rId7"/>
               </a:ext>
             </a:extLst>
           </a:blip>
@@ -4303,10 +4236,10 @@
           <p:nvPr/>
         </p:nvPicPr>
         <p:blipFill>
-          <a:blip r:embed="rId8">
+          <a:blip r:embed="rId6">
             <a:extLst>
               <a:ext uri="{96DAC541-7B7A-43D3-8B79-37D633B846F1}">
-                <asvg:svgBlip xmlns:asvg="http://schemas.microsoft.com/office/drawing/2016/SVG/main" r:embed="rId9"/>
+                <asvg:svgBlip xmlns:asvg="http://schemas.microsoft.com/office/drawing/2016/SVG/main" r:embed="rId7"/>
               </a:ext>
             </a:extLst>
           </a:blip>
@@ -4361,10 +4294,10 @@
           <p:nvPr/>
         </p:nvPicPr>
         <p:blipFill>
-          <a:blip r:embed="rId8">
+          <a:blip r:embed="rId6">
             <a:extLst>
               <a:ext uri="{96DAC541-7B7A-43D3-8B79-37D633B846F1}">
-                <asvg:svgBlip xmlns:asvg="http://schemas.microsoft.com/office/drawing/2016/SVG/main" r:embed="rId9"/>
+                <asvg:svgBlip xmlns:asvg="http://schemas.microsoft.com/office/drawing/2016/SVG/main" r:embed="rId7"/>
               </a:ext>
             </a:extLst>
           </a:blip>
@@ -4536,10 +4469,10 @@
           <p:nvPr/>
         </p:nvPicPr>
         <p:blipFill>
-          <a:blip r:embed="rId10">
+          <a:blip r:embed="rId8">
             <a:extLst>
               <a:ext uri="{96DAC541-7B7A-43D3-8B79-37D633B846F1}">
-                <asvg:svgBlip xmlns:asvg="http://schemas.microsoft.com/office/drawing/2016/SVG/main" r:embed="rId11"/>
+                <asvg:svgBlip xmlns:asvg="http://schemas.microsoft.com/office/drawing/2016/SVG/main" r:embed="rId9"/>
               </a:ext>
             </a:extLst>
           </a:blip>
@@ -4551,6 +4484,78 @@
           <a:xfrm>
             <a:off x="1435943" y="2686097"/>
             <a:ext cx="469900" cy="469900"/>
+          </a:xfrm>
+          <a:prstGeom prst="rect">
+            <a:avLst/>
+          </a:prstGeom>
+        </p:spPr>
+      </p:pic>
+      <p:pic>
+        <p:nvPicPr>
+          <p:cNvPr id="5" name="Graphic 4">
+            <a:extLst>
+              <a:ext uri="{FF2B5EF4-FFF2-40B4-BE49-F238E27FC236}">
+                <a16:creationId xmlns:a16="http://schemas.microsoft.com/office/drawing/2014/main" id="{08DBCFA8-6A6B-283D-435A-084AC1E6F6C1}"/>
+              </a:ext>
+            </a:extLst>
+          </p:cNvPr>
+          <p:cNvPicPr>
+            <a:picLocks noChangeAspect="1"/>
+          </p:cNvPicPr>
+          <p:nvPr/>
+        </p:nvPicPr>
+        <p:blipFill>
+          <a:blip r:embed="rId10">
+            <a:extLst>
+              <a:ext uri="{96DAC541-7B7A-43D3-8B79-37D633B846F1}">
+                <asvg:svgBlip xmlns:asvg="http://schemas.microsoft.com/office/drawing/2016/SVG/main" r:embed="rId11"/>
+              </a:ext>
+            </a:extLst>
+          </a:blip>
+          <a:stretch>
+            <a:fillRect/>
+          </a:stretch>
+        </p:blipFill>
+        <p:spPr>
+          <a:xfrm>
+            <a:off x="3299131" y="2712400"/>
+            <a:ext cx="457200" cy="457200"/>
+          </a:xfrm>
+          <a:prstGeom prst="rect">
+            <a:avLst/>
+          </a:prstGeom>
+        </p:spPr>
+      </p:pic>
+      <p:pic>
+        <p:nvPicPr>
+          <p:cNvPr id="6" name="Graphic 5">
+            <a:extLst>
+              <a:ext uri="{FF2B5EF4-FFF2-40B4-BE49-F238E27FC236}">
+                <a16:creationId xmlns:a16="http://schemas.microsoft.com/office/drawing/2014/main" id="{CD9C0553-BE2D-58D2-8E54-DB7EFA3D53E6}"/>
+              </a:ext>
+            </a:extLst>
+          </p:cNvPr>
+          <p:cNvPicPr>
+            <a:picLocks noChangeAspect="1"/>
+          </p:cNvPicPr>
+          <p:nvPr/>
+        </p:nvPicPr>
+        <p:blipFill>
+          <a:blip r:embed="rId10">
+            <a:extLst>
+              <a:ext uri="{96DAC541-7B7A-43D3-8B79-37D633B846F1}">
+                <asvg:svgBlip xmlns:asvg="http://schemas.microsoft.com/office/drawing/2016/SVG/main" r:embed="rId11"/>
+              </a:ext>
+            </a:extLst>
+          </a:blip>
+          <a:stretch>
+            <a:fillRect/>
+          </a:stretch>
+        </p:blipFill>
+        <p:spPr>
+          <a:xfrm>
+            <a:off x="5678510" y="2706274"/>
+            <a:ext cx="457200" cy="457200"/>
           </a:xfrm>
           <a:prstGeom prst="rect">
             <a:avLst/>

</xml_diff>